<commit_message>
NLP Intro Part 1
</commit_message>
<xml_diff>
--- a/Natural Language Processing (NLP) with Python.pptx
+++ b/Natural Language Processing (NLP) with Python.pptx
@@ -455,7 +455,7 @@
             <a:fld id="{5923F103-BC34-4FE4-A40E-EDDEECFDA5D0}" type="datetimeFigureOut">
               <a:rPr lang="en-US" dirty="0"/>
               <a:pPr/>
-              <a:t>9/13/2021</a:t>
+              <a:t>10/10/2022</a:t>
             </a:fld>
             <a:endParaRPr lang="en-US" dirty="0"/>
           </a:p>
@@ -1539,7 +1539,7 @@
           <a:p>
             <a:fld id="{923A1CC3-2375-41D4-9E03-427CAF2A4C1A}" type="datetimeFigureOut">
               <a:rPr lang="en-US" dirty="0"/>
-              <a:t>9/13/2021</a:t>
+              <a:t>10/10/2022</a:t>
             </a:fld>
             <a:endParaRPr lang="en-US" dirty="0"/>
           </a:p>
@@ -2515,7 +2515,7 @@
           <a:p>
             <a:fld id="{AFF16868-8199-4C2C-A5B1-63AEE139F88E}" type="datetimeFigureOut">
               <a:rPr lang="en-US" dirty="0"/>
-              <a:t>9/13/2021</a:t>
+              <a:t>10/10/2022</a:t>
             </a:fld>
             <a:endParaRPr lang="en-US" dirty="0"/>
           </a:p>
@@ -3645,7 +3645,7 @@
           <a:p>
             <a:fld id="{AAD9FF7F-6988-44CC-821B-644E70CD2F73}" type="datetimeFigureOut">
               <a:rPr lang="en-US" dirty="0"/>
-              <a:t>9/13/2021</a:t>
+              <a:t>10/10/2022</a:t>
             </a:fld>
             <a:endParaRPr lang="en-US" dirty="0"/>
           </a:p>
@@ -4674,7 +4674,7 @@
           <a:p>
             <a:fld id="{5C12C299-16B2-4475-990D-751901EACC14}" type="datetimeFigureOut">
               <a:rPr lang="en-US" dirty="0"/>
-              <a:t>9/13/2021</a:t>
+              <a:t>10/10/2022</a:t>
             </a:fld>
             <a:endParaRPr lang="en-US" dirty="0"/>
           </a:p>
@@ -5330,7 +5330,7 @@
           <a:p>
             <a:fld id="{9FE86839-B9D8-4651-8783-F325ECE74E65}" type="datetimeFigureOut">
               <a:rPr lang="en-US" dirty="0"/>
-              <a:t>9/13/2021</a:t>
+              <a:t>10/10/2022</a:t>
             </a:fld>
             <a:endParaRPr lang="en-US" dirty="0"/>
           </a:p>
@@ -6187,7 +6187,7 @@
           <a:p>
             <a:fld id="{FD484F64-32F6-45C5-931F-ADC1662401D0}" type="datetimeFigureOut">
               <a:rPr lang="en-US" dirty="0"/>
-              <a:t>9/13/2021</a:t>
+              <a:t>10/10/2022</a:t>
             </a:fld>
             <a:endParaRPr lang="en-US" dirty="0"/>
           </a:p>
@@ -6373,7 +6373,7 @@
           <a:p>
             <a:fld id="{53086D93-FCAC-47E0-A2EE-787E62CA814C}" type="datetimeFigureOut">
               <a:rPr lang="en-US" dirty="0"/>
-              <a:t>9/13/2021</a:t>
+              <a:t>10/10/2022</a:t>
             </a:fld>
             <a:endParaRPr lang="en-US" dirty="0"/>
           </a:p>
@@ -7341,7 +7341,7 @@
           <a:p>
             <a:fld id="{CDA879A6-0FD0-4734-A311-86BFCA472E6E}" type="datetimeFigureOut">
               <a:rPr lang="en-US" dirty="0"/>
-              <a:t>9/13/2021</a:t>
+              <a:t>10/10/2022</a:t>
             </a:fld>
             <a:endParaRPr lang="en-US" dirty="0"/>
           </a:p>
@@ -7548,7 +7548,7 @@
           <a:p>
             <a:fld id="{19C9CA7B-DFD4-44B5-8C60-D14B8CD1FB59}" type="datetimeFigureOut">
               <a:rPr lang="en-US" dirty="0"/>
-              <a:t>9/13/2021</a:t>
+              <a:t>10/10/2022</a:t>
             </a:fld>
             <a:endParaRPr lang="en-US" dirty="0"/>
           </a:p>
@@ -8578,7 +8578,7 @@
           <a:p>
             <a:fld id="{F34E6425-0181-43F2-84FC-787E803FD2F8}" type="datetimeFigureOut">
               <a:rPr lang="en-US" dirty="0"/>
-              <a:t>9/13/2021</a:t>
+              <a:t>10/10/2022</a:t>
             </a:fld>
             <a:endParaRPr lang="en-US" dirty="0"/>
           </a:p>
@@ -8846,7 +8846,7 @@
           <a:p>
             <a:fld id="{3BDB8791-F1B0-41E7-B7FD-A781E65C4266}" type="datetimeFigureOut">
               <a:rPr lang="en-US" dirty="0"/>
-              <a:t>9/13/2021</a:t>
+              <a:t>10/10/2022</a:t>
             </a:fld>
             <a:endParaRPr lang="en-US" dirty="0"/>
           </a:p>
@@ -9252,7 +9252,7 @@
           <a:p>
             <a:fld id="{5FDD63B2-E120-4ED8-B27B-C685F510A5FE}" type="datetimeFigureOut">
               <a:rPr lang="en-US" dirty="0"/>
-              <a:t>9/13/2021</a:t>
+              <a:t>10/10/2022</a:t>
             </a:fld>
             <a:endParaRPr lang="en-US" dirty="0"/>
           </a:p>
@@ -9375,7 +9375,7 @@
           <a:p>
             <a:fld id="{7AA18ACC-A947-437B-A130-35BD54FDF1E9}" type="datetimeFigureOut">
               <a:rPr lang="en-US" dirty="0"/>
-              <a:t>9/13/2021</a:t>
+              <a:t>10/10/2022</a:t>
             </a:fld>
             <a:endParaRPr lang="en-US" dirty="0"/>
           </a:p>
@@ -9466,7 +9466,7 @@
           <a:p>
             <a:fld id="{7C8D7E02-BCB8-4D50-A234-369438C08659}" type="datetimeFigureOut">
               <a:rPr lang="en-US" dirty="0"/>
-              <a:t>9/13/2021</a:t>
+              <a:t>10/10/2022</a:t>
             </a:fld>
             <a:endParaRPr lang="en-US" dirty="0"/>
           </a:p>
@@ -10543,7 +10543,7 @@
           <a:p>
             <a:fld id="{76E86A4C-8E40-4F87-A4F0-01A0687C5742}" type="datetimeFigureOut">
               <a:rPr lang="en-US" dirty="0"/>
-              <a:t>9/13/2021</a:t>
+              <a:t>10/10/2022</a:t>
             </a:fld>
             <a:endParaRPr lang="en-US" dirty="0"/>
           </a:p>
@@ -11647,7 +11647,7 @@
           <a:p>
             <a:fld id="{35E72C73-2D91-4E12-BA25-F0AA0C03599B}" type="datetimeFigureOut">
               <a:rPr lang="en-US" dirty="0"/>
-              <a:t>9/13/2021</a:t>
+              <a:t>10/10/2022</a:t>
             </a:fld>
             <a:endParaRPr lang="en-US" dirty="0"/>
           </a:p>
@@ -12640,7 +12640,7 @@
           <a:p>
             <a:fld id="{2BE451C3-0FF4-47C4-B829-773ADF60F88C}" type="datetimeFigureOut">
               <a:rPr lang="en-US" dirty="0"/>
-              <a:t>9/13/2021</a:t>
+              <a:t>10/10/2022</a:t>
             </a:fld>
             <a:endParaRPr lang="en-US" dirty="0"/>
           </a:p>
@@ -13249,13 +13249,6 @@
           </a:bodyPr>
           <a:lstStyle/>
           <a:p>
-            <a:endParaRPr lang="en-US" sz="4000" dirty="0" smtClean="0">
-              <a:solidFill>
-                <a:srgbClr val="00B0F0"/>
-              </a:solidFill>
-            </a:endParaRPr>
-          </a:p>
-          <a:p>
             <a:r>
               <a:rPr lang="en-US" sz="4000" dirty="0" smtClean="0">
                 <a:solidFill>
@@ -13941,7 +13934,14 @@
                 <a:latin typeface="Adobe Gurmukhi" panose="01010101010101010101" pitchFamily="50" charset="0"/>
                 <a:cs typeface="Adobe Gurmukhi" panose="01010101010101010101" pitchFamily="50" charset="0"/>
               </a:rPr>
-              <a:t>word </a:t>
+              <a:t>W</a:t>
+            </a:r>
+            <a:r>
+              <a:rPr lang="en-US" sz="2400" dirty="0" smtClean="0">
+                <a:latin typeface="Adobe Gurmukhi" panose="01010101010101010101" pitchFamily="50" charset="0"/>
+                <a:cs typeface="Adobe Gurmukhi" panose="01010101010101010101" pitchFamily="50" charset="0"/>
+              </a:rPr>
+              <a:t>ord </a:t>
             </a:r>
             <a:r>
               <a:rPr lang="en-US" sz="2400" dirty="0" smtClean="0">
@@ -14179,7 +14179,7 @@
           <a:p>
             <a:r>
               <a:rPr lang="en-US" sz="2800" dirty="0" smtClean="0"/>
-              <a:t>Let’s Start:</a:t>
+              <a:t>Thanks for Listening:</a:t>
             </a:r>
             <a:endParaRPr lang="en-US" sz="2800" dirty="0"/>
           </a:p>

</xml_diff>